<commit_message>
Added Glucose benchmark value
</commit_message>
<xml_diff>
--- a/Project 5_powerpoint.pptx
+++ b/Project 5_powerpoint.pptx
@@ -24,14 +24,14 @@
   <p:notesSz cx="6858000" cy="9144000"/>
   <p:embeddedFontLst>
     <p:embeddedFont>
-      <p:font typeface="Lato" panose="020B0604020202020204" charset="0"/>
+      <p:font typeface="Lato" panose="020F0502020204030203" pitchFamily="34" charset="77"/>
       <p:regular r:id="rId14"/>
       <p:bold r:id="rId15"/>
       <p:italic r:id="rId16"/>
       <p:boldItalic r:id="rId17"/>
     </p:embeddedFont>
     <p:embeddedFont>
-      <p:font typeface="Raleway" panose="020B0604020202020204" charset="0"/>
+      <p:font typeface="Raleway" panose="020B0503030101060003" pitchFamily="34" charset="77"/>
       <p:regular r:id="rId18"/>
       <p:bold r:id="rId19"/>
       <p:italic r:id="rId20"/>
@@ -1796,7 +1796,7 @@
         </p:nvSpPr>
         <p:spPr>
           <a:xfrm>
-            <a:off x="381300" y="685800"/>
+            <a:off x="381000" y="685800"/>
             <a:ext cx="6096000" cy="3429000"/>
           </a:xfrm>
           <a:custGeom>
@@ -10055,6 +10055,49 @@
           </a:ln>
         </p:spPr>
       </p:pic>
+      <p:sp>
+        <p:nvSpPr>
+          <p:cNvPr id="2" name="TextBox 1">
+            <a:extLst>
+              <a:ext uri="{FF2B5EF4-FFF2-40B4-BE49-F238E27FC236}">
+                <a16:creationId xmlns:a16="http://schemas.microsoft.com/office/drawing/2014/main" id="{91F3E307-E570-4D43-A11C-1B27F8D7812C}"/>
+              </a:ext>
+            </a:extLst>
+          </p:cNvPr>
+          <p:cNvSpPr txBox="1"/>
+          <p:nvPr/>
+        </p:nvSpPr>
+        <p:spPr>
+          <a:xfrm>
+            <a:off x="727650" y="4552622"/>
+            <a:ext cx="7074373" cy="276999"/>
+          </a:xfrm>
+          <a:prstGeom prst="rect">
+            <a:avLst/>
+          </a:prstGeom>
+          <a:noFill/>
+        </p:spPr>
+        <p:txBody>
+          <a:bodyPr wrap="none" rtlCol="0">
+            <a:spAutoFit/>
+          </a:bodyPr>
+          <a:lstStyle/>
+          <a:p>
+            <a:r>
+              <a:rPr lang="en-US" sz="1200" dirty="0"/>
+              <a:t>*For reference, a Glucose value </a:t>
+            </a:r>
+            <a:r>
+              <a:rPr lang="en-US" sz="1200"/>
+              <a:t>of &gt;140 </a:t>
+            </a:r>
+            <a:r>
+              <a:rPr lang="en-US" sz="1200" dirty="0"/>
+              <a:t>is considered abnormal and a value &gt;200 indicates diabetes</a:t>
+            </a:r>
+          </a:p>
+        </p:txBody>
+      </p:sp>
     </p:spTree>
   </p:cSld>
   <p:clrMapOvr>

</xml_diff>